<commit_message>
Add example picture and generated pptx
</commit_message>
<xml_diff>
--- a/example/example.pptx
+++ b/example/example.pptx
@@ -6,6 +6,13 @@
   </p:sldMasterIdLst>
   <p:sldIdLst>
     <p:sldId id="256" r:id="rId6"/>
+    <p:sldId id="257" r:id="rId7"/>
+    <p:sldId id="258" r:id="rId8"/>
+    <p:sldId id="259" r:id="rId9"/>
+    <p:sldId id="260" r:id="rId10"/>
+    <p:sldId id="261" r:id="rId11"/>
+    <p:sldId id="262" r:id="rId12"/>
+    <p:sldId id="263" r:id="rId13"/>
   </p:sldIdLst>
   <p:sldSz cx="9144000" cy="6858000" type="screen4x3"/>
   <p:notesSz cx="6858000" cy="9144000"/>
@@ -121,6 +128,289 @@
     </p:ext>
   </p:extLst>
 </p:presentation>
+</file>
+
+<file path=ppt/charts/chart8.xml><?xml version="1.0" encoding="utf-8"?>
+<c:chartSpace xmlns:c="http://schemas.openxmlformats.org/drawingml/2006/chart" xmlns:a="http://schemas.openxmlformats.org/drawingml/2006/main" xmlns:r="http://schemas.openxmlformats.org/officeDocument/2006/relationships">
+  <c:lang val="en-US"/>
+  <c:roundedCorners val="0"/>
+  <c:chart>
+    <c:plotArea>
+      <c:barChart>
+        <c:barDir val="col"/>
+        <c:grouping val="clustered"/>
+        <c:varyColors val="0"/>
+        <c:ser>
+          <c:idx val="0"/>
+          <c:order val="0"/>
+          <c:tx>
+            <c:strRef>
+              <c:f>label 0</c:f>
+              <c:strCache>
+                <c:ptCount val="1"/>
+                <c:pt idx="0">
+                  <c:v>Col1</c:v>
+                </c:pt>
+              </c:strCache>
+            </c:strRef>
+          </c:tx>
+          <c:spPr>
+            <a:solidFill>
+              <a:srgbClr val="004586"/>
+            </a:solidFill>
+            <a:ln>
+              <a:noFill/>
+            </a:ln>
+          </c:spPr>
+          <c:invertIfNegative val="0"/>
+          <c:dLbls>
+            <c:showLegendKey val="0"/>
+            <c:showVal val="0"/>
+            <c:showCatName val="0"/>
+            <c:showSerName val="0"/>
+            <c:showPercent val="0"/>
+            <c:showLeaderLines val="0"/>
+          </c:dLbls>
+          <c:cat>
+            <c:strRef>
+              <c:f>categories</c:f>
+              <c:strCache>
+                <c:ptCount val="4"/>
+                <c:pt idx="0">
+                  <c:v>A</c:v>
+                </c:pt>
+                <c:pt idx="1">
+                  <c:v>B</c:v>
+                </c:pt>
+                <c:pt idx="2">
+                  <c:v>C</c:v>
+                </c:pt>
+                <c:pt idx="3">
+                  <c:v>D</c:v>
+                </c:pt>
+              </c:strCache>
+            </c:strRef>
+          </c:cat>
+          <c:val>
+            <c:numRef>
+              <c:f>0</c:f>
+              <c:numCache>
+                <c:formatCode>General</c:formatCode>
+                <c:ptCount val="4"/>
+                <c:pt idx="0">
+                  <c:v>1</c:v>
+                </c:pt>
+                <c:pt idx="1">
+                  <c:v>3</c:v>
+                </c:pt>
+                <c:pt idx="2">
+                  <c:v>5</c:v>
+                </c:pt>
+                <c:pt idx="3">
+                  <c:v>7</c:v>
+                </c:pt>
+              </c:numCache>
+            </c:numRef>
+          </c:val>
+        </c:ser>
+        <c:ser>
+          <c:idx val="1"/>
+          <c:order val="1"/>
+          <c:tx>
+            <c:strRef>
+              <c:f>label 1</c:f>
+              <c:strCache>
+                <c:ptCount val="1"/>
+                <c:pt idx="0">
+                  <c:v>Col2</c:v>
+                </c:pt>
+              </c:strCache>
+            </c:strRef>
+          </c:tx>
+          <c:spPr>
+            <a:solidFill>
+              <a:srgbClr val="004586"/>
+            </a:solidFill>
+            <a:ln>
+              <a:noFill/>
+            </a:ln>
+          </c:spPr>
+          <c:invertIfNegative val="0"/>
+          <c:dLbls>
+            <c:showLegendKey val="0"/>
+            <c:showVal val="0"/>
+            <c:showCatName val="0"/>
+            <c:showSerName val="0"/>
+            <c:showPercent val="0"/>
+            <c:showLeaderLines val="0"/>
+          </c:dLbls>
+          <c:cat>
+            <c:strRef>
+              <c:f>categories</c:f>
+              <c:strCache>
+                <c:ptCount val="4"/>
+                <c:pt idx="0">
+                  <c:v>A</c:v>
+                </c:pt>
+                <c:pt idx="1">
+                  <c:v>B</c:v>
+                </c:pt>
+                <c:pt idx="2">
+                  <c:v>C</c:v>
+                </c:pt>
+                <c:pt idx="3">
+                  <c:v>D</c:v>
+                </c:pt>
+              </c:strCache>
+            </c:strRef>
+          </c:cat>
+          <c:val>
+            <c:numRef>
+              <c:f>0</c:f>
+              <c:numCache>
+                <c:formatCode>General</c:formatCode>
+                <c:ptCount val="4"/>
+                <c:pt idx="0">
+                  <c:v>2</c:v>
+                </c:pt>
+                <c:pt idx="1">
+                  <c:v>4</c:v>
+                </c:pt>
+                <c:pt idx="2">
+                  <c:v>6</c:v>
+                </c:pt>
+                <c:pt idx="3">
+                  <c:v>8</c:v>
+                </c:pt>
+              </c:numCache>
+            </c:numRef>
+          </c:val>
+        </c:ser>
+        <c:gapWidth val="100"/>
+        <c:overlap val="0"/>
+        <c:axId val="85034977"/>
+        <c:axId val="98341644"/>
+      </c:barChart>
+      <c:catAx>
+        <c:axId val="85034977"/>
+        <c:scaling>
+          <c:orientation val="minMax"/>
+        </c:scaling>
+        <c:delete val="0"/>
+        <c:axPos val="b"/>
+        <c:numFmt formatCode="DD/MM/YYYY" sourceLinked="1"/>
+        <c:majorTickMark val="out"/>
+        <c:minorTickMark val="none"/>
+        <c:tickLblPos val="nextTo"/>
+        <c:spPr>
+          <a:ln>
+            <a:solidFill>
+              <a:srgbClr val="b3b3b3"/>
+            </a:solidFill>
+          </a:ln>
+        </c:spPr>
+        <c:txPr>
+          <a:bodyPr/>
+          <a:p>
+            <a:pPr>
+              <a:defRPr b="0" sz="1000" spc="-1" strike="noStrike">
+                <a:solidFill>
+                  <a:srgbClr val="000000"/>
+                </a:solidFill>
+                <a:uFill>
+                  <a:solidFill>
+                    <a:srgbClr val="ffffff"/>
+                  </a:solidFill>
+                </a:uFill>
+                <a:latin typeface="Arial"/>
+              </a:defRPr>
+            </a:pPr>
+          </a:p>
+        </c:txPr>
+        <c:crossAx val="98341644"/>
+        <c:crosses val="autoZero"/>
+        <c:auto val="1"/>
+        <c:lblAlgn val="ctr"/>
+        <c:lblOffset val="100"/>
+      </c:catAx>
+      <c:valAx>
+        <c:axId val="98341644"/>
+        <c:scaling>
+          <c:orientation val="minMax"/>
+        </c:scaling>
+        <c:delete val="0"/>
+        <c:axPos val="l"/>
+        <c:majorGridlines>
+          <c:spPr>
+            <a:ln>
+              <a:solidFill>
+                <a:srgbClr val="b3b3b3"/>
+              </a:solidFill>
+            </a:ln>
+          </c:spPr>
+        </c:majorGridlines>
+        <c:numFmt formatCode="General" sourceLinked="1"/>
+        <c:majorTickMark val="out"/>
+        <c:minorTickMark val="none"/>
+        <c:tickLblPos val="nextTo"/>
+        <c:spPr>
+          <a:ln>
+            <a:solidFill>
+              <a:srgbClr val="b3b3b3"/>
+            </a:solidFill>
+          </a:ln>
+        </c:spPr>
+        <c:txPr>
+          <a:bodyPr/>
+          <a:p>
+            <a:pPr>
+              <a:defRPr b="0" sz="1000" spc="-1" strike="noStrike">
+                <a:solidFill>
+                  <a:srgbClr val="000000"/>
+                </a:solidFill>
+                <a:uFill>
+                  <a:solidFill>
+                    <a:srgbClr val="ffffff"/>
+                  </a:solidFill>
+                </a:uFill>
+                <a:latin typeface="Arial"/>
+              </a:defRPr>
+            </a:pPr>
+          </a:p>
+        </c:txPr>
+        <c:crossAx val="85034977"/>
+        <c:crosses val="autoZero"/>
+        <c:crossBetween val="midCat"/>
+      </c:valAx>
+      <c:spPr>
+        <a:noFill/>
+        <a:ln>
+          <a:solidFill>
+            <a:srgbClr val="b3b3b3"/>
+          </a:solidFill>
+        </a:ln>
+      </c:spPr>
+    </c:plotArea>
+    <c:legend>
+      <c:legendPos val="r"/>
+      <c:overlay val="0"/>
+      <c:spPr>
+        <a:noFill/>
+        <a:ln>
+          <a:noFill/>
+        </a:ln>
+      </c:spPr>
+    </c:legend>
+    <c:plotVisOnly val="1"/>
+    <c:dispBlanksAs val="gap"/>
+  </c:chart>
+  <c:spPr>
+    <a:noFill/>
+    <a:ln>
+      <a:noFill/>
+    </a:ln>
+  </c:spPr>
+</c:chartSpace>
 </file>
 
 <file path=ppt/slideLayouts/slideLayout1.xml><?xml version="1.0" encoding="utf-8"?>
@@ -3092,7 +3382,7 @@
           <a:p>
             <a:r>
               <a:rPr dirty="0" lang="en-US" smtClean="0"/>
-              <a:t>Title</a:t>
+              <a:t>Introduction Slide</a:t>
             </a:r>
             <a:endParaRPr dirty="0" lang="en-US"/>
           </a:p>
@@ -3115,7 +3405,7 @@
           <a:p>
             <a:r>
               <a:rPr lang="en-US" smtClean="0"/>
-              <a:t>Subtitle</a:t>
+              <a:t>Introduction Subtitle</a:t>
             </a:r>
             <a:endParaRPr lang="en-US"/>
           </a:p>
@@ -3131,6 +3421,919 @@
   <p:clrMapOvr>
     <a:masterClrMapping/>
   </p:clrMapOvr>
+</p:sld>
+</file>
+
+<file path=ppt/slides/slide2.xml><?xml version="1.0" encoding="utf-8"?>
+<p:sld xmlns:a="http://schemas.openxmlformats.org/drawingml/2006/main" xmlns:p="http://schemas.openxmlformats.org/presentationml/2006/main" xmlns:r="http://schemas.openxmlformats.org/officeDocument/2006/relationships">
+  <p:cSld>
+    <p:spTree>
+      <p:nvGrpSpPr>
+        <p:cNvPr id="1" name=""/>
+        <p:cNvGrpSpPr/>
+        <p:nvPr/>
+      </p:nvGrpSpPr>
+      <p:grpSpPr>
+        <a:xfrm>
+          <a:off x="0" y="0"/>
+          <a:ext cx="0" cy="0"/>
+          <a:chOff x="0" y="0"/>
+          <a:chExt cx="0" cy="0"/>
+        </a:xfrm>
+      </p:grpSpPr>
+      <p:sp>
+        <p:nvSpPr>
+          <p:cNvPr id="2" name="Title 1"/>
+          <p:cNvSpPr>
+            <a:spLocks noGrp="1"/>
+          </p:cNvSpPr>
+          <p:nvPr>
+            <p:ph type="title"/>
+          </p:nvPr>
+        </p:nvSpPr>
+        <p:spPr/>
+        <p:txBody>
+          <a:bodyPr/>
+          <a:lstStyle/>
+          <a:p>
+            <a:r>
+              <a:rPr dirty="0" lang="en-US" smtClean="0"/>
+              <a:t>Textual Slide</a:t>
+            </a:r>
+            <a:endParaRPr dirty="0" lang="en-US"/>
+          </a:p>
+        </p:txBody>
+      </p:sp>
+      <p:sp>
+        <p:nvSpPr>
+          <p:cNvPr id="3" name="Content Placeholder 2"/>
+          <p:cNvSpPr>
+            <a:spLocks noGrp="1"/>
+          </p:cNvSpPr>
+          <p:nvPr>
+            <p:ph idx="1"/>
+          </p:nvPr>
+        </p:nvSpPr>
+        <p:spPr/>
+        <p:txBody>
+          <a:bodyPr/>
+          <a:lstStyle/>
+          <a:p>
+            <a:r>
+              <a:rPr dirty="0" lang="en-US" smtClean="0"/>
+              <a:t>Item 1</a:t>
+            </a:r>
+          </a:p>
+          <a:p>
+            <a:r>
+              <a:rPr dirty="0" lang="en-US" smtClean="0"/>
+              <a:t>Item 2</a:t>
+            </a:r>
+          </a:p>
+          <a:p>
+            <a:r>
+              <a:rPr dirty="0" lang="en-US" smtClean="0"/>
+              <a:t>Item 3</a:t>
+            </a:r>
+            <a:endParaRPr lang="en-US"/>
+          </a:p>
+        </p:txBody>
+      </p:sp>
+    </p:spTree>
+    <p:extLst>
+      <p:ext uri="{BB962C8B-B14F-4D97-AF65-F5344CB8AC3E}">
+        <p14:creationId xmlns:p14="http://schemas.microsoft.com/office/powerpoint/2010/main" val="1231192379"/>
+      </p:ext>
+    </p:extLst>
+  </p:cSld>
+  <p:clrMapOvr>
+    <a:masterClrMapping/>
+  </p:clrMapOvr>
+</p:sld>
+</file>
+
+<file path=ppt/slides/slide3.xml><?xml version="1.0" encoding="utf-8"?>
+<p:sld xmlns:a="http://schemas.openxmlformats.org/drawingml/2006/main" xmlns:p="http://schemas.openxmlformats.org/presentationml/2006/main" xmlns:r="http://schemas.openxmlformats.org/officeDocument/2006/relationships">
+  <p:cSld>
+    <p:spTree>
+      <p:nvGrpSpPr>
+        <p:cNvPr id="1" name=""/>
+        <p:cNvGrpSpPr/>
+        <p:nvPr/>
+      </p:nvGrpSpPr>
+      <p:grpSpPr>
+        <a:xfrm>
+          <a:off x="0" y="0"/>
+          <a:ext cx="0" cy="0"/>
+          <a:chOff x="0" y="0"/>
+          <a:chExt cx="0" cy="0"/>
+        </a:xfrm>
+      </p:grpSpPr>
+      <p:sp>
+        <p:nvSpPr>
+          <p:cNvPr id="2" name="Title 1"/>
+          <p:cNvSpPr>
+            <a:spLocks noGrp="1"/>
+          </p:cNvSpPr>
+          <p:nvPr>
+            <p:ph type="title"/>
+          </p:nvPr>
+        </p:nvSpPr>
+        <p:spPr/>
+        <p:txBody>
+          <a:bodyPr/>
+          <a:lstStyle/>
+          <a:p>
+            <a:r>
+              <a:rPr dirty="0" lang="en-US" smtClean="0"/>
+              <a:t>Image Slide</a:t>
+            </a:r>
+            <a:endParaRPr dirty="0" lang="en-US"/>
+          </a:p>
+        </p:txBody>
+      </p:sp>
+      <p:pic>
+        <p:nvPicPr>
+          <p:cNvPr id="4" name="Content Placeholder 3"/>
+          <p:cNvPicPr>
+            <a:picLocks noChangeAspect="1" noGrp="1"/>
+          </p:cNvPicPr>
+          <p:nvPr>
+            <p:ph idx="1"/>
+          </p:nvPr>
+        </p:nvPicPr>
+        <p:blipFill>
+          <a:blip r:embed="rId2">
+            <a:extLst>
+              <a:ext uri="{28A0092B-C50C-407E-A947-70E740481C1C}">
+                <a14:useLocalDpi xmlns:a14="http://schemas.microsoft.com/office/drawing/2010/main" val="0"/>
+              </a:ext>
+            </a:extLst>
+          </a:blip>
+          <a:stretch>
+            <a:fillRect/>
+          </a:stretch>
+        </p:blipFill>
+        <p:spPr>
+          <a:xfrm>
+            <a:off x="3302000" y="1524000"/>
+            <a:ext cx="2540000" cy="1981200"/>
+          </a:xfrm>
+          <a:prstGeom prst="rect">
+            <a:avLst/>
+          </a:prstGeom>
+        </p:spPr>
+      </p:pic>
+    </p:spTree>
+    <p:extLst>
+      <p:ext uri="{BB962C8B-B14F-4D97-AF65-F5344CB8AC3E}">
+        <p14:creationId xmlns:p14="http://schemas.microsoft.com/office/powerpoint/2010/main" val="1474098577"/>
+      </p:ext>
+    </p:extLst>
+  </p:cSld>
+  <p:clrMapOvr>
+    <a:masterClrMapping/>
+  </p:clrMapOvr>
+</p:sld>
+</file>
+
+<file path=ppt/slides/slide4.xml><?xml version="1.0" encoding="utf-8"?>
+<p:sld xmlns:a="http://schemas.openxmlformats.org/drawingml/2006/main" xmlns:p="http://schemas.openxmlformats.org/presentationml/2006/main" xmlns:r="http://schemas.openxmlformats.org/officeDocument/2006/relationships">
+  <p:cSld>
+    <p:spTree>
+      <p:nvGrpSpPr>
+        <p:cNvPr id="1" name=""/>
+        <p:cNvGrpSpPr/>
+        <p:nvPr/>
+      </p:nvGrpSpPr>
+      <p:grpSpPr>
+        <a:xfrm>
+          <a:off x="0" y="0"/>
+          <a:ext cx="0" cy="0"/>
+          <a:chOff x="0" y="0"/>
+          <a:chExt cx="0" cy="0"/>
+        </a:xfrm>
+      </p:grpSpPr>
+      <p:sp>
+        <p:nvSpPr>
+          <p:cNvPr id="2" name="Title 1"/>
+          <p:cNvSpPr>
+            <a:spLocks noGrp="1"/>
+          </p:cNvSpPr>
+          <p:nvPr>
+            <p:ph type="title"/>
+          </p:nvPr>
+        </p:nvSpPr>
+        <p:spPr/>
+        <p:txBody>
+          <a:bodyPr/>
+          <a:lstStyle/>
+          <a:p>
+            <a:r>
+              <a:rPr dirty="0" lang="en-US" smtClean="0"/>
+              <a:t>Image Slide</a:t>
+            </a:r>
+            <a:endParaRPr dirty="0" lang="en-US"/>
+          </a:p>
+        </p:txBody>
+      </p:sp>
+      <p:pic>
+        <p:nvPicPr>
+          <p:cNvPr id="4" name="Content Placeholder 3"/>
+          <p:cNvPicPr>
+            <a:picLocks noChangeAspect="1" noGrp="1"/>
+          </p:cNvPicPr>
+          <p:nvPr>
+            <p:ph idx="1"/>
+          </p:nvPr>
+        </p:nvPicPr>
+        <p:blipFill>
+          <a:blip r:embed="rId2">
+            <a:extLst>
+              <a:ext uri="{28A0092B-C50C-407E-A947-70E740481C1C}">
+                <a14:useLocalDpi xmlns:a14="http://schemas.microsoft.com/office/drawing/2010/main" val="0"/>
+              </a:ext>
+            </a:extLst>
+          </a:blip>
+          <a:stretch>
+            <a:fillRect/>
+          </a:stretch>
+        </p:blipFill>
+        <p:spPr>
+          <a:xfrm>
+            <a:off x="6985000" y="381000"/>
+            <a:ext cx="1016000" cy="762000"/>
+          </a:xfrm>
+          <a:prstGeom prst="rect">
+            <a:avLst/>
+          </a:prstGeom>
+        </p:spPr>
+      </p:pic>
+    </p:spTree>
+    <p:extLst>
+      <p:ext uri="{BB962C8B-B14F-4D97-AF65-F5344CB8AC3E}">
+        <p14:creationId xmlns:p14="http://schemas.microsoft.com/office/powerpoint/2010/main" val="1474098577"/>
+      </p:ext>
+    </p:extLst>
+  </p:cSld>
+  <p:clrMapOvr>
+    <a:masterClrMapping/>
+  </p:clrMapOvr>
+</p:sld>
+</file>
+
+<file path=ppt/slides/slide5.xml><?xml version="1.0" encoding="utf-8"?>
+<p:sld xmlns:a="http://schemas.openxmlformats.org/drawingml/2006/main" xmlns:r="http://schemas.openxmlformats.org/officeDocument/2006/relationships" xmlns:p="http://schemas.openxmlformats.org/presentationml/2006/main">
+  <p:cSld>
+    <p:spTree>
+      <p:nvGrpSpPr>
+        <p:cNvPr id="1" name=""/>
+        <p:cNvGrpSpPr/>
+        <p:nvPr/>
+      </p:nvGrpSpPr>
+      <p:grpSpPr>
+        <a:xfrm>
+          <a:off x="0" y="0"/>
+          <a:ext cx="0" cy="0"/>
+          <a:chOff x="0" y="0"/>
+          <a:chExt cx="0" cy="0"/>
+        </a:xfrm>
+      </p:grpSpPr>
+      <p:sp>
+        <p:nvSpPr>
+          <p:cNvPr id="2" name="Title 1"/>
+          <p:cNvSpPr>
+            <a:spLocks noGrp="1"/>
+          </p:cNvSpPr>
+          <p:nvPr>
+            <p:ph type="title"/>
+          </p:nvPr>
+        </p:nvSpPr>
+        <p:spPr/>
+        <p:txBody>
+          <a:bodyPr/>
+          <a:lstStyle/>
+          <a:p>
+            <a:r>
+              <a:rPr lang="en-US" dirty="0" smtClean="0"/>
+              <a:t>Text Picture Slide</a:t>
+            </a:r>
+            <a:endParaRPr lang="en-US" dirty="0"/>
+          </a:p>
+        </p:txBody>
+      </p:sp>
+      <p:sp>
+        <p:nvSpPr>
+          <p:cNvPr id="3" name="Content Placeholder 2"/>
+          <p:cNvSpPr>
+            <a:spLocks noGrp="1"/>
+          </p:cNvSpPr>
+          <p:nvPr>
+            <p:ph sz="half" idx="1"/>
+          </p:nvPr>
+        </p:nvSpPr>
+        <p:spPr/>
+        <p:txBody>
+          <a:bodyPr/>
+          <a:lstStyle/>
+          <a:p>
+            <a:r>
+              <a:rPr lang="en-US" dirty="0" smtClean="0"/>
+              <a:t>Picture size: 2MB</a:t>
+            </a:r>
+          </a:p>
+          <a:p>
+            <a:r>
+              <a:rPr lang="en-US" dirty="0" smtClean="0"/>
+              <a:t>Picture author: Unknown Rubyist</a:t>
+            </a:r>
+            <a:endParaRPr lang="en-US"/>
+          </a:p>
+        </p:txBody>
+      </p:sp>
+      <p:pic>
+        <p:nvPicPr>
+          <p:cNvPr id="4" name="Content Placeholder 3"/>
+          <p:cNvPicPr>
+            <a:picLocks noGrp="1" noChangeAspect="1"/>
+          </p:cNvPicPr>
+          <p:nvPr>
+            <p:ph sz="half" idx="2"/>
+          </p:nvPr>
+        </p:nvPicPr>
+        <p:blipFill>
+          <a:blip r:embed="rId2">
+            <a:extLst>
+              <a:ext uri="{28A0092B-C50C-407E-A947-70E740481C1C}">
+                <a14:useLocalDpi xmlns:a14="http://schemas.microsoft.com/office/drawing/2010/main" val="0"/>
+              </a:ext>
+            </a:extLst>
+          </a:blip>
+          <a:stretch>
+            <a:fillRect/>
+          </a:stretch>
+        </p:blipFill>
+        <p:spPr>
+          <a:xfrm>
+            <a:off x="4572000" y="1524000"/>
+            <a:ext cx="2540000" cy="1981200"/>
+          </a:xfrm>
+          <a:prstGeom prst="rect">
+            <a:avLst/>
+          </a:prstGeom>
+        </p:spPr>
+      </p:pic>
+    </p:spTree>
+    <p:extLst>
+      <p:ext uri="{BB962C8B-B14F-4D97-AF65-F5344CB8AC3E}">
+        <p14:creationId xmlns:p14="http://schemas.microsoft.com/office/powerpoint/2010/main" val="1435759726"/>
+      </p:ext>
+    </p:extLst>
+  </p:cSld>
+  <p:clrMapOvr>
+    <a:masterClrMapping/>
+  </p:clrMapOvr>
+</p:sld>
+</file>
+
+<file path=ppt/slides/slide6.xml><?xml version="1.0" encoding="utf-8"?>
+<p:sld xmlns:a="http://schemas.openxmlformats.org/drawingml/2006/main" xmlns:r="http://schemas.openxmlformats.org/officeDocument/2006/relationships" xmlns:p="http://schemas.openxmlformats.org/presentationml/2006/main">
+  <p:cSld>
+    <p:spTree>
+      <p:nvGrpSpPr>
+        <p:cNvPr id="1" name=""/>
+        <p:cNvGrpSpPr/>
+        <p:nvPr/>
+      </p:nvGrpSpPr>
+      <p:grpSpPr>
+        <a:xfrm>
+          <a:off x="0" y="0"/>
+          <a:ext cx="0" cy="0"/>
+          <a:chOff x="0" y="0"/>
+          <a:chExt cx="0" cy="0"/>
+        </a:xfrm>
+      </p:grpSpPr>
+      <p:sp>
+        <p:nvSpPr>
+          <p:cNvPr id="2" name="Title 1"/>
+          <p:cNvSpPr>
+            <a:spLocks noGrp="1"/>
+          </p:cNvSpPr>
+          <p:nvPr>
+            <p:ph type="title"/>
+          </p:nvPr>
+        </p:nvSpPr>
+        <p:spPr/>
+        <p:txBody>
+          <a:bodyPr/>
+          <a:lstStyle/>
+          <a:p>
+            <a:r>
+              <a:rPr lang="en-US" dirty="0" smtClean="0"/>
+              <a:t>Picture Description Slide</a:t>
+            </a:r>
+            <a:endParaRPr lang="en-US" dirty="0"/>
+          </a:p>
+        </p:txBody>
+      </p:sp>
+      <p:pic>
+        <p:nvPicPr>
+          <p:cNvPr id="5" name="Picture Placeholder 4"/>
+          <p:cNvPicPr>
+            <a:picLocks noGrp="1" noChangeAspect="1"/>
+          </p:cNvPicPr>
+          <p:nvPr>
+            <p:ph type="pic" idx="1"/>
+          </p:nvPr>
+        </p:nvPicPr>
+        <p:blipFill>
+          <a:blip r:embed="rId2">
+            <a:extLst>
+              <a:ext uri="{28A0092B-C50C-407E-A947-70E740481C1C}">
+                <a14:useLocalDpi xmlns:a14="http://schemas.microsoft.com/office/drawing/2010/main" val="0"/>
+              </a:ext>
+            </a:extLst>
+          </a:blip>
+          <a:stretch>
+            <a:fillRect/>
+          </a:stretch>
+        </p:blipFill>
+        <p:spPr>
+          <a:xfrm>
+            <a:off x="3302000" y="762000"/>
+            <a:ext cx="2540000" cy="1981200"/>
+          </a:xfrm>
+          <a:prstGeom prst="rect">
+            <a:avLst/>
+          </a:prstGeom>
+        </p:spPr>
+      </p:pic>
+      <p:sp>
+        <p:nvSpPr>
+          <p:cNvPr id="4" name="Text Placeholder 4"/>
+          <p:cNvSpPr>
+            <a:spLocks noGrp="1"/>
+          </p:cNvSpPr>
+          <p:nvPr>
+            <p:ph type="body" sz="half" idx="2"/>
+          </p:nvPr>
+        </p:nvSpPr>
+        <p:spPr/>
+        <p:txBody>
+          <a:bodyPr/>
+          <a:lstStyle/>
+          <a:p>
+            <a:r>
+              <a:rPr lang="en-US" dirty="0" smtClean="0"/>
+              <a:t>Picture description, long text</a:t>
+            </a:r>
+          </a:p>
+          <a:p>
+            <a:r>
+              <a:rPr lang="en-US" dirty="0" smtClean="0"/>
+              <a:t>Additional information</a:t>
+            </a:r>
+            <a:endParaRPr lang="en-US"/>
+          </a:p>
+        </p:txBody>
+      </p:sp>
+    </p:spTree>
+    <p:extLst>
+      <p:ext uri="{BB962C8B-B14F-4D97-AF65-F5344CB8AC3E}">
+        <p14:creationId xmlns:p14="http://schemas.microsoft.com/office/powerpoint/2010/main" val="1435759726"/>
+      </p:ext>
+    </p:extLst>
+  </p:cSld>
+  <p:clrMapOvr>
+    <a:masterClrMapping/>
+  </p:clrMapOvr>
+</p:sld>
+</file>
+
+<file path=ppt/slides/slide7.xml><?xml version="1.0" encoding="utf-8"?>
+<p:sld xmlns:a="http://schemas.openxmlformats.org/drawingml/2006/main" xmlns:p="http://schemas.openxmlformats.org/presentationml/2006/main" xmlns:r="http://schemas.openxmlformats.org/officeDocument/2006/relationships">
+  <p:cSld>
+    <p:spTree>
+      <p:nvGrpSpPr>
+        <p:cNvPr id="1" name=""/>
+        <p:cNvGrpSpPr/>
+        <p:nvPr/>
+      </p:nvGrpSpPr>
+      <p:grpSpPr>
+        <a:xfrm>
+          <a:off x="0" y="0"/>
+          <a:ext cx="0" cy="0"/>
+          <a:chOff x="0" y="0"/>
+          <a:chExt cx="0" cy="0"/>
+        </a:xfrm>
+      </p:grpSpPr>
+      <p:sp>
+        <p:nvSpPr>
+          <p:cNvPr id="2" name="Title 1"/>
+          <p:cNvSpPr>
+            <a:spLocks noGrp="1"/>
+          </p:cNvSpPr>
+          <p:nvPr>
+            <p:ph type="title"/>
+          </p:nvPr>
+        </p:nvSpPr>
+        <p:spPr/>
+        <p:txBody>
+          <a:bodyPr/>
+          <a:lstStyle/>
+          <a:p>
+            <a:r>
+              <a:rPr dirty="0" lang="en-US" smtClean="0"/>
+              <a:t>Table Slide</a:t>
+            </a:r>
+            <a:endParaRPr dirty="0" lang="en-US"/>
+          </a:p>
+        </p:txBody>
+      </p:sp>
+      <p:graphicFrame>
+        <p:nvGraphicFramePr>
+          <p:cNvPr id="87" name="Table 2"/>
+          <p:cNvGraphicFramePr/>
+          <p:nvPr/>
+        </p:nvGraphicFramePr>
+        <p:xfrm>
+          <a:off x="2066760" y="2365560"/>
+          <a:ext cx="5075280" cy="2159280"/>
+        </p:xfrm>
+        <a:graphic>
+          <a:graphicData uri="http://schemas.openxmlformats.org/drawingml/2006/table">
+            <a:tbl>
+              <a:tblPr/>
+              <a:tblGrid>
+                <a:gridCol w="1268640"/>
+                <a:gridCol w="1268640"/>
+              </a:tblGrid>
+              <a:tr h="719640">
+                <a:tc>
+                  <a:txBody>
+                    <a:bodyPr lIns="90000" rIns="90000" tIns="46800" bIns="46800"/>
+                    <a:p>
+                      <a:r>
+                        <a:rPr b="0" lang="en-US" sz="1800" spc="-1" strike="noStrike">
+                          <a:solidFill>
+                            <a:srgbClr val="000000"/>
+                          </a:solidFill>
+                          <a:uFill>
+                            <a:solidFill>
+                              <a:srgbClr val="ffffff"/>
+                            </a:solidFill>
+                          </a:uFill>
+                          <a:latin typeface="Arial"/>
+                        </a:rPr>
+                        <a:t>HeaderA</a:t>
+                      </a:r>
+                      <a:endParaRPr b="0" lang="en-US" sz="1800" spc="-1" strike="noStrike">
+                        <a:solidFill>
+                          <a:srgbClr val="000000"/>
+                        </a:solidFill>
+                        <a:uFill>
+                          <a:solidFill>
+                            <a:srgbClr val="ffffff"/>
+                          </a:solidFill>
+                        </a:uFill>
+                        <a:latin typeface="Arial"/>
+                      </a:endParaRPr>
+                    </a:p>
+                  </a:txBody>
+                  <a:tcPr marL="90000" marR="90000">
+                    <a:lnL w="720">
+                      <a:solidFill>
+                        <a:srgbClr val="ffffff"/>
+                      </a:solidFill>
+                    </a:lnL>
+                    <a:lnR w="720">
+                      <a:solidFill>
+                        <a:srgbClr val="ffffff"/>
+                      </a:solidFill>
+                    </a:lnR>
+                    <a:lnT w="720">
+                      <a:solidFill>
+                        <a:srgbClr val="ffffff"/>
+                      </a:solidFill>
+                    </a:lnT>
+                    <a:lnB w="720">
+                      <a:solidFill>
+                        <a:srgbClr val="ffffff"/>
+                      </a:solidFill>
+                    </a:lnB>
+                    <a:solidFill>
+                      <a:srgbClr val="b3b3b3"/>
+                    </a:solidFill>
+                  </a:tcPr>
+                </a:tc>
+                <a:tc>
+                  <a:txBody>
+                    <a:bodyPr lIns="90000" rIns="90000" tIns="46800" bIns="46800"/>
+                    <a:p>
+                      <a:r>
+                        <a:rPr b="0" lang="en-US" sz="1800" spc="-1" strike="noStrike">
+                          <a:solidFill>
+                            <a:srgbClr val="000000"/>
+                          </a:solidFill>
+                          <a:uFill>
+                            <a:solidFill>
+                              <a:srgbClr val="ffffff"/>
+                            </a:solidFill>
+                          </a:uFill>
+                          <a:latin typeface="Arial"/>
+                        </a:rPr>
+                        <a:t>HeaderB</a:t>
+                      </a:r>
+                      <a:endParaRPr b="0" lang="en-US" sz="1800" spc="-1" strike="noStrike">
+                        <a:solidFill>
+                          <a:srgbClr val="000000"/>
+                        </a:solidFill>
+                        <a:uFill>
+                          <a:solidFill>
+                            <a:srgbClr val="ffffff"/>
+                          </a:solidFill>
+                        </a:uFill>
+                        <a:latin typeface="Arial"/>
+                      </a:endParaRPr>
+                    </a:p>
+                  </a:txBody>
+                  <a:tcPr marL="90000" marR="90000">
+                    <a:lnL w="720">
+                      <a:solidFill>
+                        <a:srgbClr val="ffffff"/>
+                      </a:solidFill>
+                    </a:lnL>
+                    <a:lnR w="720">
+                      <a:solidFill>
+                        <a:srgbClr val="ffffff"/>
+                      </a:solidFill>
+                    </a:lnR>
+                    <a:lnT w="720">
+                      <a:solidFill>
+                        <a:srgbClr val="ffffff"/>
+                      </a:solidFill>
+                    </a:lnT>
+                    <a:lnB w="720">
+                      <a:solidFill>
+                        <a:srgbClr val="ffffff"/>
+                      </a:solidFill>
+                    </a:lnB>
+                    <a:solidFill>
+                      <a:srgbClr val="b3b3b3"/>
+                    </a:solidFill>
+                  </a:tcPr>
+                </a:tc>
+              </a:tr>
+              <a:tr h="719640">
+                <a:tc>
+                  <a:txBody>
+                    <a:bodyPr lIns="90000" rIns="90000" tIns="46800" bIns="46800"/>
+                    <a:p>
+                      <a:r>
+                        <a:rPr b="0" lang="en-US" sz="1800" spc="-1" strike="noStrike">
+                          <a:solidFill>
+                            <a:srgbClr val="000000"/>
+                          </a:solidFill>
+                          <a:uFill>
+                            <a:solidFill>
+                              <a:srgbClr val="ffffff"/>
+                            </a:solidFill>
+                          </a:uFill>
+                          <a:latin typeface="Arial"/>
+                        </a:rPr>
+                        <a:t>ValueA</a:t>
+                      </a:r>
+                      <a:endParaRPr b="0" lang="en-US" sz="1800" spc="-1" strike="noStrike">
+                        <a:solidFill>
+                          <a:srgbClr val="000000"/>
+                        </a:solidFill>
+                        <a:uFill>
+                          <a:solidFill>
+                            <a:srgbClr val="ffffff"/>
+                          </a:solidFill>
+                        </a:uFill>
+                        <a:latin typeface="Arial"/>
+                      </a:endParaRPr>
+                    </a:p>
+                  </a:txBody>
+                  <a:tcPr marL="90000" marR="90000">
+                    <a:lnL w="720">
+                      <a:solidFill>
+                        <a:srgbClr val="ffffff"/>
+                      </a:solidFill>
+                    </a:lnL>
+                    <a:lnR w="720">
+                      <a:solidFill>
+                        <a:srgbClr val="ffffff"/>
+                      </a:solidFill>
+                    </a:lnR>
+                    <a:lnT w="720">
+                      <a:solidFill>
+                        <a:srgbClr val="ffffff"/>
+                      </a:solidFill>
+                    </a:lnT>
+                    <a:lnB w="720">
+                      <a:solidFill>
+                        <a:srgbClr val="ffffff"/>
+                      </a:solidFill>
+                    </a:lnB>
+                    <a:solidFill>
+                      <a:srgbClr val="b3b3b3"/>
+                    </a:solidFill>
+                  </a:tcPr>
+                </a:tc>
+                <a:tc>
+                  <a:txBody>
+                    <a:bodyPr lIns="90000" rIns="90000" tIns="46800" bIns="46800"/>
+                    <a:p>
+                      <a:r>
+                        <a:rPr b="0" lang="en-US" sz="1800" spc="-1" strike="noStrike">
+                          <a:solidFill>
+                            <a:srgbClr val="000000"/>
+                          </a:solidFill>
+                          <a:uFill>
+                            <a:solidFill>
+                              <a:srgbClr val="ffffff"/>
+                            </a:solidFill>
+                          </a:uFill>
+                          <a:latin typeface="Arial"/>
+                        </a:rPr>
+                        <a:t>ValueB</a:t>
+                      </a:r>
+                      <a:endParaRPr b="0" lang="en-US" sz="1800" spc="-1" strike="noStrike">
+                        <a:solidFill>
+                          <a:srgbClr val="000000"/>
+                        </a:solidFill>
+                        <a:uFill>
+                          <a:solidFill>
+                            <a:srgbClr val="ffffff"/>
+                          </a:solidFill>
+                        </a:uFill>
+                        <a:latin typeface="Arial"/>
+                      </a:endParaRPr>
+                    </a:p>
+                  </a:txBody>
+                  <a:tcPr marL="90000" marR="90000">
+                    <a:lnL w="720">
+                      <a:solidFill>
+                        <a:srgbClr val="ffffff"/>
+                      </a:solidFill>
+                    </a:lnL>
+                    <a:lnR w="720">
+                      <a:solidFill>
+                        <a:srgbClr val="ffffff"/>
+                      </a:solidFill>
+                    </a:lnR>
+                    <a:lnT w="720">
+                      <a:solidFill>
+                        <a:srgbClr val="ffffff"/>
+                      </a:solidFill>
+                    </a:lnT>
+                    <a:lnB w="720">
+                      <a:solidFill>
+                        <a:srgbClr val="ffffff"/>
+                      </a:solidFill>
+                    </a:lnB>
+                    <a:solidFill>
+                      <a:srgbClr val="b3b3b3"/>
+                    </a:solidFill>
+                  </a:tcPr>
+                </a:tc>
+              </a:tr>
+            </a:tbl>
+          </a:graphicData>
+        </a:graphic>
+      </p:graphicFrame>
+    </p:spTree>
+    <p:extLst>
+      <p:ext uri="{BB962C8B-B14F-4D97-AF65-F5344CB8AC3E}">
+        <p14:creationId xmlns:p14="http://schemas.microsoft.com/office/powerpoint/2010/main" val="1231192379"/>
+      </p:ext>
+    </p:extLst>
+  </p:cSld>
+  <p:clrMapOvr>
+    <a:masterClrMapping/>
+  </p:clrMapOvr>
+</p:sld>
+</file>
+
+<file path=ppt/slides/slide8.xml><?xml version="1.0" encoding="utf-8"?>
+<p:sld xmlns:a="http://schemas.openxmlformats.org/drawingml/2006/main" xmlns:p="http://schemas.openxmlformats.org/presentationml/2006/main" xmlns:r="http://schemas.openxmlformats.org/officeDocument/2006/relationships" xmlns:p14="http://schemas.microsoft.com/office/powerpoint/2010/main" xmlns:p15="http://schemas.microsoft.com/office/powerpoint/2012/main" xmlns:mc="http://schemas.openxmlformats.org/markup-compatibility/2006">
+  <p:cSld>
+    <p:spTree>
+      <p:nvGrpSpPr>
+        <p:cNvPr id="1" name=""/>
+        <p:cNvGrpSpPr/>
+        <p:nvPr/>
+      </p:nvGrpSpPr>
+      <p:grpSpPr>
+        <a:xfrm>
+          <a:off x="0" y="0"/>
+          <a:ext cx="0" cy="0"/>
+          <a:chOff x="0" y="0"/>
+          <a:chExt cx="0" cy="0"/>
+        </a:xfrm>
+      </p:grpSpPr>
+      <p:sp>
+        <p:nvSpPr>
+          <p:cNvPr id="84" name="TextShape 1"/>
+          <p:cNvSpPr txBox="1"/>
+          <p:nvPr/>
+        </p:nvSpPr>
+        <p:spPr>
+          <a:xfrm>
+            <a:off x="457200" y="274680"/>
+            <a:ext cx="8229240" cy="1142640"/>
+          </a:xfrm>
+          <a:prstGeom prst="rect">
+            <a:avLst/>
+          </a:prstGeom>
+          <a:noFill/>
+          <a:ln>
+            <a:noFill/>
+          </a:ln>
+        </p:spPr>
+        <p:txBody>
+          <a:bodyPr anchor="ctr"/>
+          <a:p>
+            <a:pPr algn="ctr">
+              <a:lnSpc>
+                <a:spcPct val="100000"/>
+              </a:lnSpc>
+            </a:pPr>
+            <a:r>
+              <a:rPr b="0" lang="en-US" sz="4400" spc="-1" strike="noStrike">
+                <a:solidFill>
+                  <a:srgbClr val="000000"/>
+                </a:solidFill>
+                <a:uFill>
+                  <a:solidFill>
+                    <a:srgbClr val="ffffff"/>
+                  </a:solidFill>
+                </a:uFill>
+                <a:latin typeface="Calibri"/>
+              </a:rPr>
+              <a:t>Chart Slide</a:t>
+            </a:r>
+            <a:endParaRPr b="0" lang="en-US" sz="1800" spc="-1" strike="noStrike">
+              <a:solidFill>
+                <a:srgbClr val="000000"/>
+              </a:solidFill>
+              <a:uFill>
+                <a:solidFill>
+                  <a:srgbClr val="ffffff"/>
+                </a:solidFill>
+              </a:uFill>
+              <a:latin typeface="Calibri"/>
+            </a:endParaRPr>
+          </a:p>
+        </p:txBody>
+      </p:sp>
+      <p:graphicFrame>
+        <p:nvGraphicFramePr>
+          <p:cNvPr id="42" name=""/>
+          <p:cNvGraphicFramePr/>
+          <p:nvPr/>
+        </p:nvGraphicFramePr>
+        <p:xfrm>
+          <a:off x="2175840" y="2237040"/>
+          <a:ext cx="5766840" cy="3232800"/>
+        </p:xfrm>
+        <a:graphic>
+          <a:graphicData uri="http://schemas.openxmlformats.org/drawingml/2006/chart">
+            <c:chart xmlns:c="http://schemas.openxmlformats.org/drawingml/2006/chart" xmlns:r="http://schemas.openxmlformats.org/officeDocument/2006/relationships" r:id="rId1"/>
+          </a:graphicData>
+        </a:graphic>
+      </p:graphicFrame>
+    </p:spTree>
+  </p:cSld>
+  <p:timing>
+    <p:tnLst>
+      <p:par>
+        <p:cTn id="1" dur="indefinite" restart="never" nodeType="tmRoot">
+          <p:childTnLst>
+            <p:seq>
+              <p:cTn id="2" nodeType="mainSeq"/>
+              <p:prevCondLst>
+                <p:cond delay="0" evt="onPrev">
+                  <p:tgtEl>
+                    <p:sldTgt/>
+                  </p:tgtEl>
+                </p:cond>
+              </p:prevCondLst>
+              <p:nextCondLst>
+                <p:cond delay="0" evt="onNext">
+                  <p:tgtEl>
+                    <p:sldTgt/>
+                  </p:tgtEl>
+                </p:cond>
+              </p:nextCondLst>
+            </p:seq>
+          </p:childTnLst>
+        </p:cTn>
+      </p:par>
+    </p:tnLst>
+  </p:timing>
 </p:sld>
 </file>
 

</xml_diff>